<commit_message>
Updated lifelines in the two diagrams
</commit_message>
<xml_diff>
--- a/docs/diagrams/ReverseSequenceDiagram.pptx
+++ b/docs/diagrams/ReverseSequenceDiagram.pptx
@@ -208,7 +208,7 @@
           <a:p>
             <a:fld id="{F5CC4B3F-88C1-4FFA-B1B6-F41C21DC6924}" type="datetimeFigureOut">
               <a:rPr lang="en-US" smtClean="0"/>
-              <a:t>4/2/2019</a:t>
+              <a:t>4/12/2019</a:t>
             </a:fld>
             <a:endParaRPr lang="en-US"/>
           </a:p>
@@ -742,7 +742,7 @@
           <a:p>
             <a:fld id="{78C97017-6FC3-485B-9764-EAC9E56C1D49}" type="datetimeFigureOut">
               <a:rPr lang="en-US" smtClean="0"/>
-              <a:t>4/2/2019</a:t>
+              <a:t>4/12/2019</a:t>
             </a:fld>
             <a:endParaRPr lang="en-US"/>
           </a:p>
@@ -910,7 +910,7 @@
           <a:p>
             <a:fld id="{78C97017-6FC3-485B-9764-EAC9E56C1D49}" type="datetimeFigureOut">
               <a:rPr lang="en-US" smtClean="0"/>
-              <a:t>4/2/2019</a:t>
+              <a:t>4/12/2019</a:t>
             </a:fld>
             <a:endParaRPr lang="en-US"/>
           </a:p>
@@ -1088,7 +1088,7 @@
           <a:p>
             <a:fld id="{78C97017-6FC3-485B-9764-EAC9E56C1D49}" type="datetimeFigureOut">
               <a:rPr lang="en-US" smtClean="0"/>
-              <a:t>4/2/2019</a:t>
+              <a:t>4/12/2019</a:t>
             </a:fld>
             <a:endParaRPr lang="en-US"/>
           </a:p>
@@ -1256,7 +1256,7 @@
           <a:p>
             <a:fld id="{78C97017-6FC3-485B-9764-EAC9E56C1D49}" type="datetimeFigureOut">
               <a:rPr lang="en-US" smtClean="0"/>
-              <a:t>4/2/2019</a:t>
+              <a:t>4/12/2019</a:t>
             </a:fld>
             <a:endParaRPr lang="en-US"/>
           </a:p>
@@ -1501,7 +1501,7 @@
           <a:p>
             <a:fld id="{78C97017-6FC3-485B-9764-EAC9E56C1D49}" type="datetimeFigureOut">
               <a:rPr lang="en-US" smtClean="0"/>
-              <a:t>4/2/2019</a:t>
+              <a:t>4/12/2019</a:t>
             </a:fld>
             <a:endParaRPr lang="en-US"/>
           </a:p>
@@ -1786,7 +1786,7 @@
           <a:p>
             <a:fld id="{78C97017-6FC3-485B-9764-EAC9E56C1D49}" type="datetimeFigureOut">
               <a:rPr lang="en-US" smtClean="0"/>
-              <a:t>4/2/2019</a:t>
+              <a:t>4/12/2019</a:t>
             </a:fld>
             <a:endParaRPr lang="en-US"/>
           </a:p>
@@ -2205,7 +2205,7 @@
           <a:p>
             <a:fld id="{78C97017-6FC3-485B-9764-EAC9E56C1D49}" type="datetimeFigureOut">
               <a:rPr lang="en-US" smtClean="0"/>
-              <a:t>4/2/2019</a:t>
+              <a:t>4/12/2019</a:t>
             </a:fld>
             <a:endParaRPr lang="en-US"/>
           </a:p>
@@ -2322,7 +2322,7 @@
           <a:p>
             <a:fld id="{78C97017-6FC3-485B-9764-EAC9E56C1D49}" type="datetimeFigureOut">
               <a:rPr lang="en-US" smtClean="0"/>
-              <a:t>4/2/2019</a:t>
+              <a:t>4/12/2019</a:t>
             </a:fld>
             <a:endParaRPr lang="en-US"/>
           </a:p>
@@ -2417,7 +2417,7 @@
           <a:p>
             <a:fld id="{78C97017-6FC3-485B-9764-EAC9E56C1D49}" type="datetimeFigureOut">
               <a:rPr lang="en-US" smtClean="0"/>
-              <a:t>4/2/2019</a:t>
+              <a:t>4/12/2019</a:t>
             </a:fld>
             <a:endParaRPr lang="en-US"/>
           </a:p>
@@ -2692,7 +2692,7 @@
           <a:p>
             <a:fld id="{78C97017-6FC3-485B-9764-EAC9E56C1D49}" type="datetimeFigureOut">
               <a:rPr lang="en-US" smtClean="0"/>
-              <a:t>4/2/2019</a:t>
+              <a:t>4/12/2019</a:t>
             </a:fld>
             <a:endParaRPr lang="en-US"/>
           </a:p>
@@ -2944,7 +2944,7 @@
           <a:p>
             <a:fld id="{78C97017-6FC3-485B-9764-EAC9E56C1D49}" type="datetimeFigureOut">
               <a:rPr lang="en-US" smtClean="0"/>
-              <a:t>4/2/2019</a:t>
+              <a:t>4/12/2019</a:t>
             </a:fld>
             <a:endParaRPr lang="en-US"/>
           </a:p>
@@ -3155,7 +3155,7 @@
           <a:p>
             <a:fld id="{78C97017-6FC3-485B-9764-EAC9E56C1D49}" type="datetimeFigureOut">
               <a:rPr lang="en-US" smtClean="0"/>
-              <a:t>4/2/2019</a:t>
+              <a:t>4/12/2019</a:t>
             </a:fld>
             <a:endParaRPr lang="en-US"/>
           </a:p>
@@ -3530,6 +3530,51 @@
           <a:chExt cx="0" cy="0"/>
         </a:xfrm>
       </p:grpSpPr>
+      <p:cxnSp>
+        <p:nvCxnSpPr>
+          <p:cNvPr id="58" name="Straight Connector 57">
+            <a:extLst>
+              <a:ext uri="{FF2B5EF4-FFF2-40B4-BE49-F238E27FC236}">
+                <a16:creationId xmlns:a16="http://schemas.microsoft.com/office/drawing/2014/main" id="{6B0C17AF-9569-4FB8-8DED-0D8AC0F1D392}"/>
+              </a:ext>
+            </a:extLst>
+          </p:cNvPr>
+          <p:cNvCxnSpPr>
+            <a:cxnSpLocks/>
+          </p:cNvCxnSpPr>
+          <p:nvPr/>
+        </p:nvCxnSpPr>
+        <p:spPr>
+          <a:xfrm>
+            <a:off x="5332155" y="4597186"/>
+            <a:ext cx="0" cy="1073583"/>
+          </a:xfrm>
+          <a:prstGeom prst="line">
+            <a:avLst/>
+          </a:prstGeom>
+          <a:ln w="19050">
+            <a:solidFill>
+              <a:srgbClr val="0070C0"/>
+            </a:solidFill>
+            <a:prstDash val="sysDash"/>
+          </a:ln>
+          <a:effectLst/>
+        </p:spPr>
+        <p:style>
+          <a:lnRef idx="1">
+            <a:schemeClr val="accent1"/>
+          </a:lnRef>
+          <a:fillRef idx="2">
+            <a:schemeClr val="accent1"/>
+          </a:fillRef>
+          <a:effectRef idx="1">
+            <a:schemeClr val="accent1"/>
+          </a:effectRef>
+          <a:fontRef idx="minor">
+            <a:schemeClr val="dk1"/>
+          </a:fontRef>
+        </p:style>
+      </p:cxnSp>
       <p:sp>
         <p:nvSpPr>
           <p:cNvPr id="56" name="Rectangle 65"/>
@@ -3730,7 +3775,7 @@
         <p:spPr>
           <a:xfrm>
             <a:off x="506059" y="907617"/>
-            <a:ext cx="0" cy="3481399"/>
+            <a:ext cx="0" cy="5052570"/>
           </a:xfrm>
           <a:prstGeom prst="line">
             <a:avLst/>
@@ -4094,7 +4139,7 @@
         </p:nvSpPr>
         <p:spPr>
           <a:xfrm>
-            <a:off x="-891446" y="990600"/>
+            <a:off x="-990600" y="990600"/>
             <a:ext cx="1424846" cy="215444"/>
           </a:xfrm>
           <a:prstGeom prst="rect">

</xml_diff>